<commit_message>
Sample files for test
Sample available as examples for execution.
</commit_message>
<xml_diff>
--- a/sample/cert.pptx
+++ b/sample/cert.pptx
@@ -5,10 +5,11 @@
     <p:sldMasterId id="2147483660" r:id="rId4"/>
   </p:sldMasterIdLst>
   <p:notesMasterIdLst>
-    <p:notesMasterId r:id="rId6"/>
+    <p:notesMasterId r:id="rId7"/>
   </p:notesMasterIdLst>
   <p:sldIdLst>
     <p:sldId id="257" r:id="rId5"/>
+    <p:sldId id="258" r:id="rId6"/>
   </p:sldIdLst>
   <p:sldSz cx="10058400" cy="7772400"/>
   <p:notesSz cx="6858000" cy="9144000"/>
@@ -118,37 +119,6 @@
 <file path=ppt/changesInfos/changesInfo1.xml><?xml version="1.0" encoding="utf-8"?>
 <pc:chgInfo xmlns:a="http://schemas.openxmlformats.org/drawingml/2006/main" xmlns:r="http://schemas.openxmlformats.org/officeDocument/2006/relationships" xmlns:ac="http://schemas.microsoft.com/office/drawing/2013/main/command" xmlns:pc="http://schemas.microsoft.com/office/powerpoint/2013/main/command">
   <pc:docChgLst>
-    <pc:chgData name="Bopaiah Mekerira" userId="1d6cb8287584e859" providerId="LiveId" clId="{7C5232D3-AB37-446C-9FB7-82D65FF3A083}"/>
-    <pc:docChg chg="delSld modSld">
-      <pc:chgData name="Bopaiah Mekerira" userId="1d6cb8287584e859" providerId="LiveId" clId="{7C5232D3-AB37-446C-9FB7-82D65FF3A083}" dt="2024-10-27T16:32:06.547" v="1" actId="14100"/>
-      <pc:docMkLst>
-        <pc:docMk/>
-      </pc:docMkLst>
-      <pc:sldChg chg="modSp mod">
-        <pc:chgData name="Bopaiah Mekerira" userId="1d6cb8287584e859" providerId="LiveId" clId="{7C5232D3-AB37-446C-9FB7-82D65FF3A083}" dt="2024-10-27T16:32:06.547" v="1" actId="14100"/>
-        <pc:sldMkLst>
-          <pc:docMk/>
-          <pc:sldMk cId="1524164542" sldId="257"/>
-        </pc:sldMkLst>
-        <pc:spChg chg="mod">
-          <ac:chgData name="Bopaiah Mekerira" userId="1d6cb8287584e859" providerId="LiveId" clId="{7C5232D3-AB37-446C-9FB7-82D65FF3A083}" dt="2024-10-27T16:32:06.547" v="1" actId="14100"/>
-          <ac:spMkLst>
-            <pc:docMk/>
-            <pc:sldMk cId="1524164542" sldId="257"/>
-            <ac:spMk id="9" creationId="{232F12C5-51B7-F9EE-4D4C-1DDD83980F29}"/>
-          </ac:spMkLst>
-        </pc:spChg>
-      </pc:sldChg>
-      <pc:sldChg chg="del">
-        <pc:chgData name="Bopaiah Mekerira" userId="1d6cb8287584e859" providerId="LiveId" clId="{7C5232D3-AB37-446C-9FB7-82D65FF3A083}" dt="2024-10-27T11:26:34.526" v="0" actId="2696"/>
-        <pc:sldMkLst>
-          <pc:docMk/>
-          <pc:sldMk cId="3801682161" sldId="258"/>
-        </pc:sldMkLst>
-      </pc:sldChg>
-    </pc:docChg>
-  </pc:docChgLst>
-  <pc:docChgLst>
     <pc:chgData name="Bopaiah Mekerira" userId="1d6cb8287584e859" providerId="LiveId" clId="{F2973D93-EB52-4783-9F13-AD28C8937220}"/>
     <pc:docChg chg="undo custSel modSld">
       <pc:chgData name="Bopaiah Mekerira" userId="1d6cb8287584e859" providerId="LiveId" clId="{F2973D93-EB52-4783-9F13-AD28C8937220}" dt="2024-10-26T07:10:11.567" v="75" actId="14100"/>
@@ -212,6 +182,37 @@
       </pc:sldChg>
     </pc:docChg>
   </pc:docChgLst>
+  <pc:docChgLst>
+    <pc:chgData name="Bopaiah Mekerira" userId="1d6cb8287584e859" providerId="LiveId" clId="{7C5232D3-AB37-446C-9FB7-82D65FF3A083}"/>
+    <pc:docChg chg="delSld modSld">
+      <pc:chgData name="Bopaiah Mekerira" userId="1d6cb8287584e859" providerId="LiveId" clId="{7C5232D3-AB37-446C-9FB7-82D65FF3A083}" dt="2024-10-27T16:32:06.547" v="1" actId="14100"/>
+      <pc:docMkLst>
+        <pc:docMk/>
+      </pc:docMkLst>
+      <pc:sldChg chg="modSp mod">
+        <pc:chgData name="Bopaiah Mekerira" userId="1d6cb8287584e859" providerId="LiveId" clId="{7C5232D3-AB37-446C-9FB7-82D65FF3A083}" dt="2024-10-27T16:32:06.547" v="1" actId="14100"/>
+        <pc:sldMkLst>
+          <pc:docMk/>
+          <pc:sldMk cId="1524164542" sldId="257"/>
+        </pc:sldMkLst>
+        <pc:spChg chg="mod">
+          <ac:chgData name="Bopaiah Mekerira" userId="1d6cb8287584e859" providerId="LiveId" clId="{7C5232D3-AB37-446C-9FB7-82D65FF3A083}" dt="2024-10-27T16:32:06.547" v="1" actId="14100"/>
+          <ac:spMkLst>
+            <pc:docMk/>
+            <pc:sldMk cId="1524164542" sldId="257"/>
+            <ac:spMk id="9" creationId="{232F12C5-51B7-F9EE-4D4C-1DDD83980F29}"/>
+          </ac:spMkLst>
+        </pc:spChg>
+      </pc:sldChg>
+      <pc:sldChg chg="del">
+        <pc:chgData name="Bopaiah Mekerira" userId="1d6cb8287584e859" providerId="LiveId" clId="{7C5232D3-AB37-446C-9FB7-82D65FF3A083}" dt="2024-10-27T11:26:34.526" v="0" actId="2696"/>
+        <pc:sldMkLst>
+          <pc:docMk/>
+          <pc:sldMk cId="3801682161" sldId="258"/>
+        </pc:sldMkLst>
+      </pc:sldChg>
+    </pc:docChg>
+  </pc:docChgLst>
 </pc:chgInfo>
 </file>
 
@@ -297,7 +298,7 @@
           <a:p>
             <a:fld id="{88D3CA3B-6FFF-8E4B-8564-9BF322D7F4EF}" type="datetimeFigureOut">
               <a:rPr lang="en-US" smtClean="0"/>
-              <a:t>10/27/2024</a:t>
+              <a:t>12/2/2024</a:t>
             </a:fld>
             <a:endParaRPr lang="en-US" dirty="0"/>
           </a:p>
@@ -639,6 +640,114 @@
     <p:extLst>
       <p:ext uri="{BB962C8B-B14F-4D97-AF65-F5344CB8AC3E}">
         <p14:creationId xmlns:p14="http://schemas.microsoft.com/office/powerpoint/2010/main" val="1997564472"/>
+      </p:ext>
+    </p:extLst>
+  </p:cSld>
+  <p:clrMapOvr>
+    <a:masterClrMapping/>
+  </p:clrMapOvr>
+</p:notes>
+</file>
+
+<file path=ppt/notesSlides/notesSlide2.xml><?xml version="1.0" encoding="utf-8"?>
+<p:notes xmlns:a="http://schemas.openxmlformats.org/drawingml/2006/main" xmlns:r="http://schemas.openxmlformats.org/officeDocument/2006/relationships" xmlns:p="http://schemas.openxmlformats.org/presentationml/2006/main">
+  <p:cSld>
+    <p:spTree>
+      <p:nvGrpSpPr>
+        <p:cNvPr id="1" name="">
+          <a:extLst>
+            <a:ext uri="{FF2B5EF4-FFF2-40B4-BE49-F238E27FC236}">
+              <a16:creationId xmlns:a16="http://schemas.microsoft.com/office/drawing/2014/main" id="{58F6EA4A-5C1C-3339-33DA-CC2DD1F14F3A}"/>
+            </a:ext>
+          </a:extLst>
+        </p:cNvPr>
+        <p:cNvGrpSpPr/>
+        <p:nvPr/>
+      </p:nvGrpSpPr>
+      <p:grpSpPr>
+        <a:xfrm>
+          <a:off x="0" y="0"/>
+          <a:ext cx="0" cy="0"/>
+          <a:chOff x="0" y="0"/>
+          <a:chExt cx="0" cy="0"/>
+        </a:xfrm>
+      </p:grpSpPr>
+      <p:sp>
+        <p:nvSpPr>
+          <p:cNvPr id="2" name="Slide Image Placeholder 1">
+            <a:extLst>
+              <a:ext uri="{FF2B5EF4-FFF2-40B4-BE49-F238E27FC236}">
+                <a16:creationId xmlns:a16="http://schemas.microsoft.com/office/drawing/2014/main" id="{0B1F2D7F-E107-D114-D7E8-58A6E2397F1C}"/>
+              </a:ext>
+            </a:extLst>
+          </p:cNvPr>
+          <p:cNvSpPr>
+            <a:spLocks noGrp="1" noRot="1" noChangeAspect="1"/>
+          </p:cNvSpPr>
+          <p:nvPr>
+            <p:ph type="sldImg"/>
+          </p:nvPr>
+        </p:nvSpPr>
+        <p:spPr/>
+      </p:sp>
+      <p:sp>
+        <p:nvSpPr>
+          <p:cNvPr id="3" name="Notes Placeholder 2">
+            <a:extLst>
+              <a:ext uri="{FF2B5EF4-FFF2-40B4-BE49-F238E27FC236}">
+                <a16:creationId xmlns:a16="http://schemas.microsoft.com/office/drawing/2014/main" id="{4C29D782-73E6-BDCA-6FF9-595CFB8CFBCA}"/>
+              </a:ext>
+            </a:extLst>
+          </p:cNvPr>
+          <p:cNvSpPr>
+            <a:spLocks noGrp="1"/>
+          </p:cNvSpPr>
+          <p:nvPr>
+            <p:ph type="body" idx="1"/>
+          </p:nvPr>
+        </p:nvSpPr>
+        <p:spPr/>
+        <p:txBody>
+          <a:bodyPr/>
+          <a:lstStyle/>
+          <a:p>
+            <a:endParaRPr lang="en-US" dirty="0"/>
+          </a:p>
+        </p:txBody>
+      </p:sp>
+      <p:sp>
+        <p:nvSpPr>
+          <p:cNvPr id="4" name="Slide Number Placeholder 3">
+            <a:extLst>
+              <a:ext uri="{FF2B5EF4-FFF2-40B4-BE49-F238E27FC236}">
+                <a16:creationId xmlns:a16="http://schemas.microsoft.com/office/drawing/2014/main" id="{0E9C9152-CC4C-DFBC-7C6F-F9F4F61A4AFB}"/>
+              </a:ext>
+            </a:extLst>
+          </p:cNvPr>
+          <p:cNvSpPr>
+            <a:spLocks noGrp="1"/>
+          </p:cNvSpPr>
+          <p:nvPr>
+            <p:ph type="sldNum" sz="quarter" idx="5"/>
+          </p:nvPr>
+        </p:nvSpPr>
+        <p:spPr/>
+        <p:txBody>
+          <a:bodyPr/>
+          <a:lstStyle/>
+          <a:p>
+            <a:fld id="{25F1EAC3-25C7-104C-99C2-19941016B69E}" type="slidenum">
+              <a:rPr lang="en-US" smtClean="0"/>
+              <a:t>2</a:t>
+            </a:fld>
+            <a:endParaRPr lang="en-US" dirty="0"/>
+          </a:p>
+        </p:txBody>
+      </p:sp>
+    </p:spTree>
+    <p:extLst>
+      <p:ext uri="{BB962C8B-B14F-4D97-AF65-F5344CB8AC3E}">
+        <p14:creationId xmlns:p14="http://schemas.microsoft.com/office/powerpoint/2010/main" val="829735604"/>
       </p:ext>
     </p:extLst>
   </p:cSld>
@@ -2270,6 +2379,555 @@
     <p:extLst>
       <p:ext uri="{BB962C8B-B14F-4D97-AF65-F5344CB8AC3E}">
         <p14:creationId xmlns:p14="http://schemas.microsoft.com/office/powerpoint/2010/main" val="1524164542"/>
+      </p:ext>
+    </p:extLst>
+  </p:cSld>
+  <p:clrMapOvr>
+    <a:masterClrMapping/>
+  </p:clrMapOvr>
+</p:sld>
+</file>
+
+<file path=ppt/slides/slide2.xml><?xml version="1.0" encoding="utf-8"?>
+<p:sld xmlns:a="http://schemas.openxmlformats.org/drawingml/2006/main" xmlns:r="http://schemas.openxmlformats.org/officeDocument/2006/relationships" xmlns:p="http://schemas.openxmlformats.org/presentationml/2006/main">
+  <p:cSld>
+    <p:spTree>
+      <p:nvGrpSpPr>
+        <p:cNvPr id="1" name="">
+          <a:extLst>
+            <a:ext uri="{FF2B5EF4-FFF2-40B4-BE49-F238E27FC236}">
+              <a16:creationId xmlns:a16="http://schemas.microsoft.com/office/drawing/2014/main" id="{93A5E946-D46D-9F9A-6229-031DE7F18FB1}"/>
+            </a:ext>
+          </a:extLst>
+        </p:cNvPr>
+        <p:cNvGrpSpPr/>
+        <p:nvPr/>
+      </p:nvGrpSpPr>
+      <p:grpSpPr>
+        <a:xfrm>
+          <a:off x="0" y="0"/>
+          <a:ext cx="0" cy="0"/>
+          <a:chOff x="0" y="0"/>
+          <a:chExt cx="0" cy="0"/>
+        </a:xfrm>
+      </p:grpSpPr>
+      <p:sp>
+        <p:nvSpPr>
+          <p:cNvPr id="5" name="Employee of the Month">
+            <a:extLst>
+              <a:ext uri="{FF2B5EF4-FFF2-40B4-BE49-F238E27FC236}">
+                <a16:creationId xmlns:a16="http://schemas.microsoft.com/office/drawing/2014/main" id="{FEC5262C-3388-60DD-D715-DADFDB07D7D9}"/>
+              </a:ext>
+            </a:extLst>
+          </p:cNvPr>
+          <p:cNvSpPr>
+            <a:spLocks noGrp="1"/>
+          </p:cNvSpPr>
+          <p:nvPr>
+            <p:ph type="title"/>
+          </p:nvPr>
+        </p:nvSpPr>
+        <p:spPr>
+          <a:xfrm>
+            <a:off x="668086" y="1746673"/>
+            <a:ext cx="8674100" cy="361950"/>
+          </a:xfrm>
+        </p:spPr>
+        <p:txBody>
+          <a:bodyPr/>
+          <a:lstStyle/>
+          <a:p>
+            <a:r>
+              <a:rPr lang="en-US" dirty="0"/>
+              <a:t>CERTIFICATE OF PARTICIPATION</a:t>
+            </a:r>
+          </a:p>
+        </p:txBody>
+      </p:sp>
+      <p:sp>
+        <p:nvSpPr>
+          <p:cNvPr id="2" name="awarded to">
+            <a:extLst>
+              <a:ext uri="{FF2B5EF4-FFF2-40B4-BE49-F238E27FC236}">
+                <a16:creationId xmlns:a16="http://schemas.microsoft.com/office/drawing/2014/main" id="{70AC2288-7B78-7F45-B835-89AC30C02BB1}"/>
+              </a:ext>
+            </a:extLst>
+          </p:cNvPr>
+          <p:cNvSpPr>
+            <a:spLocks noGrp="1"/>
+          </p:cNvSpPr>
+          <p:nvPr>
+            <p:ph type="body" sz="quarter" idx="10"/>
+          </p:nvPr>
+        </p:nvSpPr>
+        <p:spPr>
+          <a:xfrm>
+            <a:off x="3337718" y="2703158"/>
+            <a:ext cx="3382963" cy="375094"/>
+          </a:xfrm>
+        </p:spPr>
+        <p:txBody>
+          <a:bodyPr/>
+          <a:lstStyle/>
+          <a:p>
+            <a:r>
+              <a:rPr lang="en-US" dirty="0"/>
+              <a:t>Awarded to</a:t>
+            </a:r>
+          </a:p>
+        </p:txBody>
+      </p:sp>
+      <p:sp>
+        <p:nvSpPr>
+          <p:cNvPr id="3" name="Name">
+            <a:extLst>
+              <a:ext uri="{FF2B5EF4-FFF2-40B4-BE49-F238E27FC236}">
+                <a16:creationId xmlns:a16="http://schemas.microsoft.com/office/drawing/2014/main" id="{41744572-6393-4D66-D405-735D2D7DC483}"/>
+              </a:ext>
+            </a:extLst>
+          </p:cNvPr>
+          <p:cNvSpPr>
+            <a:spLocks noGrp="1"/>
+          </p:cNvSpPr>
+          <p:nvPr>
+            <p:ph type="body" sz="quarter" idx="12"/>
+          </p:nvPr>
+        </p:nvSpPr>
+        <p:spPr>
+          <a:xfrm>
+            <a:off x="692149" y="3219450"/>
+            <a:ext cx="8674099" cy="1114425"/>
+          </a:xfrm>
+        </p:spPr>
+        <p:txBody>
+          <a:bodyPr/>
+          <a:lstStyle/>
+          <a:p>
+            <a:r>
+              <a:rPr lang="en-US" dirty="0" err="1"/>
+              <a:t>emp_name</a:t>
+            </a:r>
+            <a:endParaRPr lang="en-US" dirty="0"/>
+          </a:p>
+          <a:p>
+            <a:endParaRPr lang="en-US" b="0" dirty="0"/>
+          </a:p>
+        </p:txBody>
+      </p:sp>
+      <p:sp>
+        <p:nvSpPr>
+          <p:cNvPr id="4" name="in recognition of your dedication, passion, and hard work">
+            <a:extLst>
+              <a:ext uri="{FF2B5EF4-FFF2-40B4-BE49-F238E27FC236}">
+                <a16:creationId xmlns:a16="http://schemas.microsoft.com/office/drawing/2014/main" id="{DC5FDB87-E2C2-8925-8BF0-6FCA022D1207}"/>
+              </a:ext>
+            </a:extLst>
+          </p:cNvPr>
+          <p:cNvSpPr>
+            <a:spLocks noGrp="1"/>
+          </p:cNvSpPr>
+          <p:nvPr>
+            <p:ph type="body" sz="quarter" idx="13"/>
+          </p:nvPr>
+        </p:nvSpPr>
+        <p:spPr>
+          <a:xfrm>
+            <a:off x="1291588" y="4967985"/>
+            <a:ext cx="7475220" cy="793984"/>
+          </a:xfrm>
+        </p:spPr>
+        <p:txBody>
+          <a:bodyPr/>
+          <a:lstStyle/>
+          <a:p>
+            <a:r>
+              <a:rPr lang="en-US" dirty="0"/>
+              <a:t>for attending the TOPs convention in the month of January</a:t>
+            </a:r>
+          </a:p>
+        </p:txBody>
+      </p:sp>
+      <p:sp>
+        <p:nvSpPr>
+          <p:cNvPr id="8" name="Text Placeholder 7">
+            <a:extLst>
+              <a:ext uri="{FF2B5EF4-FFF2-40B4-BE49-F238E27FC236}">
+                <a16:creationId xmlns:a16="http://schemas.microsoft.com/office/drawing/2014/main" id="{7F95B10C-F7C7-4205-B284-BC91B4BBCF9A}"/>
+              </a:ext>
+            </a:extLst>
+          </p:cNvPr>
+          <p:cNvSpPr>
+            <a:spLocks noGrp="1"/>
+          </p:cNvSpPr>
+          <p:nvPr>
+            <p:ph type="body" sz="quarter" idx="17"/>
+          </p:nvPr>
+        </p:nvSpPr>
+        <p:spPr>
+          <a:xfrm>
+            <a:off x="5323358" y="5608991"/>
+            <a:ext cx="3227110" cy="512763"/>
+          </a:xfrm>
+        </p:spPr>
+        <p:txBody>
+          <a:bodyPr/>
+          <a:lstStyle/>
+          <a:p>
+            <a:r>
+              <a:rPr lang="en-US" dirty="0"/>
+              <a:t>February 04, 20XX</a:t>
+            </a:r>
+          </a:p>
+        </p:txBody>
+      </p:sp>
+      <p:sp>
+        <p:nvSpPr>
+          <p:cNvPr id="6" name="Text Placeholder 5">
+            <a:extLst>
+              <a:ext uri="{FF2B5EF4-FFF2-40B4-BE49-F238E27FC236}">
+                <a16:creationId xmlns:a16="http://schemas.microsoft.com/office/drawing/2014/main" id="{A7A10937-CD94-3782-06D2-1CFD82FCF9FE}"/>
+              </a:ext>
+            </a:extLst>
+          </p:cNvPr>
+          <p:cNvSpPr>
+            <a:spLocks noGrp="1"/>
+          </p:cNvSpPr>
+          <p:nvPr>
+            <p:ph type="body" sz="quarter" idx="15"/>
+          </p:nvPr>
+        </p:nvSpPr>
+        <p:spPr>
+          <a:xfrm>
+            <a:off x="1837063" y="6236009"/>
+            <a:ext cx="3227110" cy="512763"/>
+          </a:xfrm>
+        </p:spPr>
+        <p:txBody>
+          <a:bodyPr/>
+          <a:lstStyle/>
+          <a:p>
+            <a:r>
+              <a:rPr lang="en-US" dirty="0"/>
+              <a:t>Aiko Wantanabe, Manager</a:t>
+            </a:r>
+          </a:p>
+          <a:p>
+            <a:endParaRPr lang="en-US" dirty="0"/>
+          </a:p>
+        </p:txBody>
+      </p:sp>
+      <p:sp>
+        <p:nvSpPr>
+          <p:cNvPr id="7" name="Text Placeholder 6">
+            <a:extLst>
+              <a:ext uri="{FF2B5EF4-FFF2-40B4-BE49-F238E27FC236}">
+                <a16:creationId xmlns:a16="http://schemas.microsoft.com/office/drawing/2014/main" id="{E5C242E6-0A40-AB54-858C-82A120682348}"/>
+              </a:ext>
+            </a:extLst>
+          </p:cNvPr>
+          <p:cNvSpPr>
+            <a:spLocks noGrp="1"/>
+          </p:cNvSpPr>
+          <p:nvPr>
+            <p:ph type="body" sz="quarter" idx="16"/>
+          </p:nvPr>
+        </p:nvSpPr>
+        <p:spPr>
+          <a:xfrm>
+            <a:off x="5311783" y="6236009"/>
+            <a:ext cx="3227110" cy="512763"/>
+          </a:xfrm>
+        </p:spPr>
+        <p:txBody>
+          <a:bodyPr/>
+          <a:lstStyle/>
+          <a:p>
+            <a:r>
+              <a:rPr lang="en-US" dirty="0"/>
+              <a:t>Date</a:t>
+            </a:r>
+          </a:p>
+        </p:txBody>
+      </p:sp>
+      <p:sp>
+        <p:nvSpPr>
+          <p:cNvPr id="9" name="TextBox 8">
+            <a:extLst>
+              <a:ext uri="{FF2B5EF4-FFF2-40B4-BE49-F238E27FC236}">
+                <a16:creationId xmlns:a16="http://schemas.microsoft.com/office/drawing/2014/main" id="{A32624BC-923A-5C8C-E858-2A6FBAFA2AF4}"/>
+              </a:ext>
+            </a:extLst>
+          </p:cNvPr>
+          <p:cNvSpPr txBox="1"/>
+          <p:nvPr/>
+        </p:nvSpPr>
+        <p:spPr>
+          <a:xfrm>
+            <a:off x="2379307" y="792137"/>
+            <a:ext cx="6962880" cy="369332"/>
+          </a:xfrm>
+          <a:prstGeom prst="rect">
+            <a:avLst/>
+          </a:prstGeom>
+          <a:noFill/>
+        </p:spPr>
+        <p:txBody>
+          <a:bodyPr wrap="square" rtlCol="0">
+            <a:spAutoFit/>
+          </a:bodyPr>
+          <a:lstStyle/>
+          <a:p>
+            <a:pPr algn="r"/>
+            <a:r>
+              <a:rPr lang="en-IN" dirty="0" err="1">
+                <a:latin typeface="Algerian" panose="04020705040A02060702" pitchFamily="82" charset="0"/>
+              </a:rPr>
+              <a:t>company_name</a:t>
+            </a:r>
+            <a:endParaRPr lang="en-IN" dirty="0">
+              <a:latin typeface="Algerian" panose="04020705040A02060702" pitchFamily="82" charset="0"/>
+            </a:endParaRPr>
+          </a:p>
+        </p:txBody>
+      </p:sp>
+      <p:sp>
+        <p:nvSpPr>
+          <p:cNvPr id="10" name="Name">
+            <a:extLst>
+              <a:ext uri="{FF2B5EF4-FFF2-40B4-BE49-F238E27FC236}">
+                <a16:creationId xmlns:a16="http://schemas.microsoft.com/office/drawing/2014/main" id="{F8D9CE07-EEF3-617F-9938-38586BFA4ADE}"/>
+              </a:ext>
+            </a:extLst>
+          </p:cNvPr>
+          <p:cNvSpPr txBox="1">
+            <a:spLocks/>
+          </p:cNvSpPr>
+          <p:nvPr/>
+        </p:nvSpPr>
+        <p:spPr>
+          <a:xfrm>
+            <a:off x="1846506" y="5468514"/>
+            <a:ext cx="8211894" cy="1114425"/>
+          </a:xfrm>
+          <a:prstGeom prst="rect">
+            <a:avLst/>
+          </a:prstGeom>
+        </p:spPr>
+        <p:txBody>
+          <a:bodyPr/>
+          <a:lstStyle>
+            <a:lvl1pPr marL="0" indent="0" algn="ctr" defTabSz="1005840" rtl="0" eaLnBrk="1" latinLnBrk="0" hangingPunct="1">
+              <a:lnSpc>
+                <a:spcPct val="90000"/>
+              </a:lnSpc>
+              <a:spcBef>
+                <a:spcPts val="1100"/>
+              </a:spcBef>
+              <a:buFont typeface="Arial" panose="020B0604020202020204" pitchFamily="34" charset="0"/>
+              <a:buNone/>
+              <a:defRPr sz="6600" b="1" i="0" kern="1200">
+                <a:solidFill>
+                  <a:schemeClr val="tx1"/>
+                </a:solidFill>
+                <a:latin typeface="+mj-lt"/>
+                <a:ea typeface="+mn-ea"/>
+                <a:cs typeface="+mn-cs"/>
+              </a:defRPr>
+            </a:lvl1pPr>
+            <a:lvl2pPr marL="754380" indent="-251460" algn="l" defTabSz="1005840" rtl="0" eaLnBrk="1" latinLnBrk="0" hangingPunct="1">
+              <a:lnSpc>
+                <a:spcPct val="90000"/>
+              </a:lnSpc>
+              <a:spcBef>
+                <a:spcPts val="550"/>
+              </a:spcBef>
+              <a:buFont typeface="Arial" panose="020B0604020202020204" pitchFamily="34" charset="0"/>
+              <a:buChar char="•"/>
+              <a:defRPr sz="2640" kern="1200">
+                <a:solidFill>
+                  <a:schemeClr val="tx1"/>
+                </a:solidFill>
+                <a:latin typeface="+mn-lt"/>
+                <a:ea typeface="+mn-ea"/>
+                <a:cs typeface="+mn-cs"/>
+              </a:defRPr>
+            </a:lvl2pPr>
+            <a:lvl3pPr marL="1257300" indent="-251460" algn="l" defTabSz="1005840" rtl="0" eaLnBrk="1" latinLnBrk="0" hangingPunct="1">
+              <a:lnSpc>
+                <a:spcPct val="90000"/>
+              </a:lnSpc>
+              <a:spcBef>
+                <a:spcPts val="550"/>
+              </a:spcBef>
+              <a:buFont typeface="Arial" panose="020B0604020202020204" pitchFamily="34" charset="0"/>
+              <a:buChar char="•"/>
+              <a:defRPr sz="2200" kern="1200">
+                <a:solidFill>
+                  <a:schemeClr val="tx1"/>
+                </a:solidFill>
+                <a:latin typeface="+mn-lt"/>
+                <a:ea typeface="+mn-ea"/>
+                <a:cs typeface="+mn-cs"/>
+              </a:defRPr>
+            </a:lvl3pPr>
+            <a:lvl4pPr marL="1760220" indent="-251460" algn="l" defTabSz="1005840" rtl="0" eaLnBrk="1" latinLnBrk="0" hangingPunct="1">
+              <a:lnSpc>
+                <a:spcPct val="90000"/>
+              </a:lnSpc>
+              <a:spcBef>
+                <a:spcPts val="550"/>
+              </a:spcBef>
+              <a:buFont typeface="Arial" panose="020B0604020202020204" pitchFamily="34" charset="0"/>
+              <a:buChar char="•"/>
+              <a:defRPr sz="1980" kern="1200">
+                <a:solidFill>
+                  <a:schemeClr val="tx1"/>
+                </a:solidFill>
+                <a:latin typeface="+mn-lt"/>
+                <a:ea typeface="+mn-ea"/>
+                <a:cs typeface="+mn-cs"/>
+              </a:defRPr>
+            </a:lvl4pPr>
+            <a:lvl5pPr marL="2263140" indent="-251460" algn="l" defTabSz="1005840" rtl="0" eaLnBrk="1" latinLnBrk="0" hangingPunct="1">
+              <a:lnSpc>
+                <a:spcPct val="90000"/>
+              </a:lnSpc>
+              <a:spcBef>
+                <a:spcPts val="550"/>
+              </a:spcBef>
+              <a:buFont typeface="Arial" panose="020B0604020202020204" pitchFamily="34" charset="0"/>
+              <a:buChar char="•"/>
+              <a:defRPr sz="1980" kern="1200">
+                <a:solidFill>
+                  <a:schemeClr val="tx1"/>
+                </a:solidFill>
+                <a:latin typeface="+mn-lt"/>
+                <a:ea typeface="+mn-ea"/>
+                <a:cs typeface="+mn-cs"/>
+              </a:defRPr>
+            </a:lvl5pPr>
+            <a:lvl6pPr marL="2766060" indent="-251460" algn="l" defTabSz="1005840" rtl="0" eaLnBrk="1" latinLnBrk="0" hangingPunct="1">
+              <a:lnSpc>
+                <a:spcPct val="90000"/>
+              </a:lnSpc>
+              <a:spcBef>
+                <a:spcPts val="550"/>
+              </a:spcBef>
+              <a:buFont typeface="Arial" panose="020B0604020202020204" pitchFamily="34" charset="0"/>
+              <a:buChar char="•"/>
+              <a:defRPr sz="1980" kern="1200">
+                <a:solidFill>
+                  <a:schemeClr val="tx1"/>
+                </a:solidFill>
+                <a:latin typeface="+mn-lt"/>
+                <a:ea typeface="+mn-ea"/>
+                <a:cs typeface="+mn-cs"/>
+              </a:defRPr>
+            </a:lvl6pPr>
+            <a:lvl7pPr marL="3268980" indent="-251460" algn="l" defTabSz="1005840" rtl="0" eaLnBrk="1" latinLnBrk="0" hangingPunct="1">
+              <a:lnSpc>
+                <a:spcPct val="90000"/>
+              </a:lnSpc>
+              <a:spcBef>
+                <a:spcPts val="550"/>
+              </a:spcBef>
+              <a:buFont typeface="Arial" panose="020B0604020202020204" pitchFamily="34" charset="0"/>
+              <a:buChar char="•"/>
+              <a:defRPr sz="1980" kern="1200">
+                <a:solidFill>
+                  <a:schemeClr val="tx1"/>
+                </a:solidFill>
+                <a:latin typeface="+mn-lt"/>
+                <a:ea typeface="+mn-ea"/>
+                <a:cs typeface="+mn-cs"/>
+              </a:defRPr>
+            </a:lvl7pPr>
+            <a:lvl8pPr marL="3771900" indent="-251460" algn="l" defTabSz="1005840" rtl="0" eaLnBrk="1" latinLnBrk="0" hangingPunct="1">
+              <a:lnSpc>
+                <a:spcPct val="90000"/>
+              </a:lnSpc>
+              <a:spcBef>
+                <a:spcPts val="550"/>
+              </a:spcBef>
+              <a:buFont typeface="Arial" panose="020B0604020202020204" pitchFamily="34" charset="0"/>
+              <a:buChar char="•"/>
+              <a:defRPr sz="1980" kern="1200">
+                <a:solidFill>
+                  <a:schemeClr val="tx1"/>
+                </a:solidFill>
+                <a:latin typeface="+mn-lt"/>
+                <a:ea typeface="+mn-ea"/>
+                <a:cs typeface="+mn-cs"/>
+              </a:defRPr>
+            </a:lvl8pPr>
+            <a:lvl9pPr marL="4274820" indent="-251460" algn="l" defTabSz="1005840" rtl="0" eaLnBrk="1" latinLnBrk="0" hangingPunct="1">
+              <a:lnSpc>
+                <a:spcPct val="90000"/>
+              </a:lnSpc>
+              <a:spcBef>
+                <a:spcPts val="550"/>
+              </a:spcBef>
+              <a:buFont typeface="Arial" panose="020B0604020202020204" pitchFamily="34" charset="0"/>
+              <a:buChar char="•"/>
+              <a:defRPr sz="1980" kern="1200">
+                <a:solidFill>
+                  <a:schemeClr val="tx1"/>
+                </a:solidFill>
+                <a:latin typeface="+mn-lt"/>
+                <a:ea typeface="+mn-ea"/>
+                <a:cs typeface="+mn-cs"/>
+              </a:defRPr>
+            </a:lvl9pPr>
+          </a:lstStyle>
+          <a:p>
+            <a:pPr algn="l"/>
+            <a:r>
+              <a:rPr lang="en-US" sz="4400" dirty="0"/>
+              <a:t>signature</a:t>
+            </a:r>
+          </a:p>
+        </p:txBody>
+      </p:sp>
+      <p:pic>
+        <p:nvPicPr>
+          <p:cNvPr id="12" name="Picture 11">
+            <a:extLst>
+              <a:ext uri="{FF2B5EF4-FFF2-40B4-BE49-F238E27FC236}">
+                <a16:creationId xmlns:a16="http://schemas.microsoft.com/office/drawing/2014/main" id="{9A15E29F-7E2D-CE94-3DE5-1777030597C0}"/>
+              </a:ext>
+            </a:extLst>
+          </p:cNvPr>
+          <p:cNvPicPr>
+            <a:picLocks noChangeAspect="1"/>
+          </p:cNvPicPr>
+          <p:nvPr/>
+        </p:nvPicPr>
+        <p:blipFill>
+          <a:blip r:embed="rId3">
+            <a:extLst>
+              <a:ext uri="{837473B0-CC2E-450A-ABE3-18F120FF3D39}">
+                <a1611:picAttrSrcUrl xmlns:a1611="http://schemas.microsoft.com/office/drawing/2016/11/main" r:id="rId4"/>
+              </a:ext>
+            </a:extLst>
+          </a:blip>
+          <a:stretch>
+            <a:fillRect/>
+          </a:stretch>
+        </p:blipFill>
+        <p:spPr>
+          <a:xfrm>
+            <a:off x="7708260" y="5264026"/>
+            <a:ext cx="1166718" cy="1202692"/>
+          </a:xfrm>
+          <a:prstGeom prst="rect">
+            <a:avLst/>
+          </a:prstGeom>
+        </p:spPr>
+      </p:pic>
+    </p:spTree>
+    <p:extLst>
+      <p:ext uri="{BB962C8B-B14F-4D97-AF65-F5344CB8AC3E}">
+        <p14:creationId xmlns:p14="http://schemas.microsoft.com/office/powerpoint/2010/main" val="1497152075"/>
       </p:ext>
     </p:extLst>
   </p:cSld>
@@ -2776,12 +3434,22 @@
 </file>
 
 <file path=customXml/item1.xml><?xml version="1.0" encoding="utf-8"?>
-<?mso-contentType ?>
-<FormTemplates xmlns="http://schemas.microsoft.com/sharepoint/v3/contenttype/forms">
-  <Display>DocumentLibraryForm</Display>
-  <Edit>DocumentLibraryForm</Edit>
-  <New>DocumentLibraryForm</New>
-</FormTemplates>
+<p:properties xmlns:p="http://schemas.microsoft.com/office/2006/metadata/properties" xmlns:xsi="http://www.w3.org/2001/XMLSchema-instance" xmlns:pc="http://schemas.microsoft.com/office/infopath/2007/PartnerControls">
+  <documentManagement>
+    <Status xmlns="71af3243-3dd4-4a8d-8c0d-dd76da1f02a5">Not started</Status>
+    <_ip_UnifiedCompliancePolicyUIAction xmlns="http://schemas.microsoft.com/sharepoint/v3" xsi:nil="true"/>
+    <Image xmlns="71af3243-3dd4-4a8d-8c0d-dd76da1f02a5">
+      <Url xsi:nil="true"/>
+      <Description xsi:nil="true"/>
+    </Image>
+    <_ip_UnifiedCompliancePolicyProperties xmlns="http://schemas.microsoft.com/sharepoint/v3" xsi:nil="true"/>
+    <lcf76f155ced4ddcb4097134ff3c332f xmlns="71af3243-3dd4-4a8d-8c0d-dd76da1f02a5">
+      <Terms xmlns="http://schemas.microsoft.com/office/infopath/2007/PartnerControls"/>
+    </lcf76f155ced4ddcb4097134ff3c332f>
+    <TaxCatchAll xmlns="230e9df3-be65-4c73-a93b-d1236ebd677e"/>
+    <MediaServiceKeyPoints xmlns="71af3243-3dd4-4a8d-8c0d-dd76da1f02a5" xsi:nil="true"/>
+  </documentManagement>
+</p:properties>
 </file>
 
 <file path=customXml/item2.xml><?xml version="1.0" encoding="utf-8"?>
@@ -3061,28 +3729,22 @@
 </file>
 
 <file path=customXml/item3.xml><?xml version="1.0" encoding="utf-8"?>
-<p:properties xmlns:p="http://schemas.microsoft.com/office/2006/metadata/properties" xmlns:xsi="http://www.w3.org/2001/XMLSchema-instance" xmlns:pc="http://schemas.microsoft.com/office/infopath/2007/PartnerControls">
-  <documentManagement>
-    <Status xmlns="71af3243-3dd4-4a8d-8c0d-dd76da1f02a5">Not started</Status>
-    <_ip_UnifiedCompliancePolicyUIAction xmlns="http://schemas.microsoft.com/sharepoint/v3" xsi:nil="true"/>
-    <Image xmlns="71af3243-3dd4-4a8d-8c0d-dd76da1f02a5">
-      <Url xsi:nil="true"/>
-      <Description xsi:nil="true"/>
-    </Image>
-    <_ip_UnifiedCompliancePolicyProperties xmlns="http://schemas.microsoft.com/sharepoint/v3" xsi:nil="true"/>
-    <lcf76f155ced4ddcb4097134ff3c332f xmlns="71af3243-3dd4-4a8d-8c0d-dd76da1f02a5">
-      <Terms xmlns="http://schemas.microsoft.com/office/infopath/2007/PartnerControls"/>
-    </lcf76f155ced4ddcb4097134ff3c332f>
-    <TaxCatchAll xmlns="230e9df3-be65-4c73-a93b-d1236ebd677e"/>
-    <MediaServiceKeyPoints xmlns="71af3243-3dd4-4a8d-8c0d-dd76da1f02a5" xsi:nil="true"/>
-  </documentManagement>
-</p:properties>
+<?mso-contentType ?>
+<FormTemplates xmlns="http://schemas.microsoft.com/sharepoint/v3/contenttype/forms">
+  <Display>DocumentLibraryForm</Display>
+  <Edit>DocumentLibraryForm</Edit>
+  <New>DocumentLibraryForm</New>
+</FormTemplates>
 </file>
 
 <file path=customXml/itemProps1.xml><?xml version="1.0" encoding="utf-8"?>
-<ds:datastoreItem xmlns:ds="http://schemas.openxmlformats.org/officeDocument/2006/customXml" ds:itemID="{D30F9EC8-EA21-4CDF-970B-AF02B81BDA08}">
+<ds:datastoreItem xmlns:ds="http://schemas.openxmlformats.org/officeDocument/2006/customXml" ds:itemID="{242F88F4-AD99-47B2-A845-1F80E7FFF670}">
   <ds:schemaRefs>
-    <ds:schemaRef ds:uri="http://schemas.microsoft.com/sharepoint/v3/contenttype/forms"/>
+    <ds:schemaRef ds:uri="http://schemas.microsoft.com/office/2006/metadata/properties"/>
+    <ds:schemaRef ds:uri="http://schemas.microsoft.com/office/infopath/2007/PartnerControls"/>
+    <ds:schemaRef ds:uri="71af3243-3dd4-4a8d-8c0d-dd76da1f02a5"/>
+    <ds:schemaRef ds:uri="http://schemas.microsoft.com/sharepoint/v3"/>
+    <ds:schemaRef ds:uri="230e9df3-be65-4c73-a93b-d1236ebd677e"/>
   </ds:schemaRefs>
 </ds:datastoreItem>
 </file>
@@ -3109,13 +3771,9 @@
 </file>
 
 <file path=customXml/itemProps3.xml><?xml version="1.0" encoding="utf-8"?>
-<ds:datastoreItem xmlns:ds="http://schemas.openxmlformats.org/officeDocument/2006/customXml" ds:itemID="{242F88F4-AD99-47B2-A845-1F80E7FFF670}">
+<ds:datastoreItem xmlns:ds="http://schemas.openxmlformats.org/officeDocument/2006/customXml" ds:itemID="{D30F9EC8-EA21-4CDF-970B-AF02B81BDA08}">
   <ds:schemaRefs>
-    <ds:schemaRef ds:uri="http://schemas.microsoft.com/office/2006/metadata/properties"/>
-    <ds:schemaRef ds:uri="http://schemas.microsoft.com/office/infopath/2007/PartnerControls"/>
-    <ds:schemaRef ds:uri="71af3243-3dd4-4a8d-8c0d-dd76da1f02a5"/>
-    <ds:schemaRef ds:uri="http://schemas.microsoft.com/sharepoint/v3"/>
-    <ds:schemaRef ds:uri="230e9df3-be65-4c73-a93b-d1236ebd677e"/>
+    <ds:schemaRef ds:uri="http://schemas.microsoft.com/sharepoint/v3/contenttype/forms"/>
   </ds:schemaRefs>
 </ds:datastoreItem>
 </file>
</xml_diff>